<commit_message>
Update QUE DEBES CONOCER PARA GANAR CUALQUER BATALLA OTRA VERSION.pptx
</commit_message>
<xml_diff>
--- a/QUE DEBES CONOCER PARA GANAR CUALQUER BATALLA OTRA VERSION.pptx
+++ b/QUE DEBES CONOCER PARA GANAR CUALQUER BATALLA OTRA VERSION.pptx
@@ -11,12 +11,12 @@
     <p:sldId id="269" r:id="rId5"/>
     <p:sldId id="270" r:id="rId6"/>
     <p:sldId id="271" r:id="rId7"/>
-    <p:sldId id="263" r:id="rId8"/>
-    <p:sldId id="260" r:id="rId9"/>
-    <p:sldId id="259" r:id="rId10"/>
-    <p:sldId id="267" r:id="rId11"/>
-    <p:sldId id="268" r:id="rId12"/>
-    <p:sldId id="264" r:id="rId13"/>
+    <p:sldId id="260" r:id="rId8"/>
+    <p:sldId id="263" r:id="rId9"/>
+    <p:sldId id="267" r:id="rId10"/>
+    <p:sldId id="264" r:id="rId11"/>
+    <p:sldId id="259" r:id="rId12"/>
+    <p:sldId id="268" r:id="rId13"/>
     <p:sldId id="265" r:id="rId14"/>
     <p:sldId id="266" r:id="rId15"/>
     <p:sldId id="272" r:id="rId16"/>
@@ -7860,249 +7860,45 @@
           <a:chExt cx="0" cy="0"/>
         </a:xfrm>
       </p:grpSpPr>
-      <p:sp>
-        <p:nvSpPr>
-          <p:cNvPr id="2" name="Título 1">
+      <p:pic>
+        <p:nvPicPr>
+          <p:cNvPr id="5" name="Marcador de contenido 4">
             <a:extLst>
               <a:ext uri="{FF2B5EF4-FFF2-40B4-BE49-F238E27FC236}">
-                <a16:creationId xmlns:a16="http://schemas.microsoft.com/office/drawing/2014/main" id="{D78D24A6-82F6-B69C-DBE8-E34AD5BC5FD6}"/>
+                <a16:creationId xmlns:a16="http://schemas.microsoft.com/office/drawing/2014/main" id="{8A711D6B-AC0E-AF2F-2379-6039A51B9994}"/>
               </a:ext>
             </a:extLst>
           </p:cNvPr>
-          <p:cNvSpPr>
-            <a:spLocks noGrp="1"/>
-          </p:cNvSpPr>
-          <p:nvPr>
-            <p:ph type="title"/>
-          </p:nvPr>
-        </p:nvSpPr>
-        <p:spPr/>
-        <p:txBody>
-          <a:bodyPr/>
-          <a:lstStyle/>
-          <a:p>
-            <a:r>
-              <a:rPr lang="es-MX" sz="2800" dirty="0"/>
-              <a:t>Sintaxis</a:t>
-            </a:r>
-            <a:endParaRPr lang="es-CO" dirty="0"/>
-          </a:p>
-        </p:txBody>
-      </p:sp>
-      <p:sp>
-        <p:nvSpPr>
-          <p:cNvPr id="3" name="Marcador de contenido 2">
+          <p:cNvPicPr>
+            <a:picLocks noGrp="1" noChangeAspect="1"/>
+          </p:cNvPicPr>
+          <p:nvPr>
+            <p:ph idx="1"/>
+          </p:nvPr>
+        </p:nvPicPr>
+        <p:blipFill>
+          <a:blip r:embed="rId2">
             <a:extLst>
-              <a:ext uri="{FF2B5EF4-FFF2-40B4-BE49-F238E27FC236}">
-                <a16:creationId xmlns:a16="http://schemas.microsoft.com/office/drawing/2014/main" id="{4C5CB410-5020-313C-2271-B98893D6CD0B}"/>
+              <a:ext uri="{28A0092B-C50C-407E-A947-70E740481C1C}">
+                <a14:useLocalDpi xmlns:a14="http://schemas.microsoft.com/office/drawing/2010/main" val="0"/>
               </a:ext>
             </a:extLst>
-          </p:cNvPr>
-          <p:cNvSpPr>
-            <a:spLocks noGrp="1"/>
-          </p:cNvSpPr>
-          <p:nvPr>
-            <p:ph idx="1"/>
-          </p:nvPr>
-        </p:nvSpPr>
-        <p:spPr/>
-        <p:txBody>
-          <a:bodyPr>
-            <a:noAutofit/>
-          </a:bodyPr>
-          <a:lstStyle/>
-          <a:p>
-            <a:r>
-              <a:rPr lang="es-ES" dirty="0">
-                <a:latin typeface="Trebuchet MS (Títulos)"/>
-              </a:rPr>
-              <a:t>Es difícil describir sucintamente cómo funciona ggplot2 porque encarna una profunda filosofía de visualización. Sin embargo, en la mayoría de los casos, comienza con:</a:t>
-            </a:r>
-          </a:p>
-          <a:p>
-            <a:r>
-              <a:rPr lang="es-ES" dirty="0" err="1">
-                <a:latin typeface="Trebuchet MS (Títulos)"/>
-              </a:rPr>
-              <a:t>ggplot</a:t>
-            </a:r>
-            <a:r>
-              <a:rPr lang="es-ES" dirty="0">
-                <a:latin typeface="Trebuchet MS (Títulos)"/>
-              </a:rPr>
-              <a:t>(</a:t>
-            </a:r>
-            <a:r>
-              <a:rPr lang="es-ES" dirty="0" err="1">
-                <a:latin typeface="Trebuchet MS (Títulos)"/>
-              </a:rPr>
-              <a:t>datos_grafico</a:t>
-            </a:r>
-            <a:r>
-              <a:rPr lang="es-ES" dirty="0">
-                <a:latin typeface="Trebuchet MS (Títulos)"/>
-              </a:rPr>
-              <a:t>, </a:t>
-            </a:r>
-          </a:p>
-          <a:p>
-            <a:r>
-              <a:rPr lang="es-ES" dirty="0">
-                <a:latin typeface="Trebuchet MS (Títulos)"/>
-              </a:rPr>
-              <a:t>aes(x = Palabra, y = Numero, </a:t>
-            </a:r>
-            <a:r>
-              <a:rPr lang="es-ES" dirty="0" err="1">
-                <a:latin typeface="Trebuchet MS (Títulos)"/>
-              </a:rPr>
-              <a:t>fill</a:t>
-            </a:r>
-            <a:r>
-              <a:rPr lang="es-ES" dirty="0">
-                <a:latin typeface="Trebuchet MS (Títulos)"/>
-              </a:rPr>
-              <a:t> = Palabra)) + </a:t>
-            </a:r>
-          </a:p>
-          <a:p>
-            <a:r>
-              <a:rPr lang="es-ES" dirty="0" err="1">
-                <a:latin typeface="Trebuchet MS (Títulos)"/>
-              </a:rPr>
-              <a:t>geom_bar</a:t>
-            </a:r>
-            <a:r>
-              <a:rPr lang="es-ES" dirty="0">
-                <a:latin typeface="Trebuchet MS (Títulos)"/>
-              </a:rPr>
-              <a:t>(</a:t>
-            </a:r>
-            <a:r>
-              <a:rPr lang="es-ES" dirty="0" err="1">
-                <a:latin typeface="Trebuchet MS (Títulos)"/>
-              </a:rPr>
-              <a:t>stat</a:t>
-            </a:r>
-            <a:r>
-              <a:rPr lang="es-ES" dirty="0">
-                <a:latin typeface="Trebuchet MS (Títulos)"/>
-              </a:rPr>
-              <a:t> = "</a:t>
-            </a:r>
-            <a:r>
-              <a:rPr lang="es-ES" dirty="0" err="1">
-                <a:latin typeface="Trebuchet MS (Títulos)"/>
-              </a:rPr>
-              <a:t>identity</a:t>
-            </a:r>
-            <a:r>
-              <a:rPr lang="es-ES" dirty="0">
-                <a:latin typeface="Trebuchet MS (Títulos)"/>
-              </a:rPr>
-              <a:t>", color = "</a:t>
-            </a:r>
-            <a:r>
-              <a:rPr lang="es-ES" dirty="0" err="1">
-                <a:latin typeface="Trebuchet MS (Títulos)"/>
-              </a:rPr>
-              <a:t>black</a:t>
-            </a:r>
-            <a:r>
-              <a:rPr lang="es-ES" dirty="0">
-                <a:latin typeface="Trebuchet MS (Títulos)"/>
-              </a:rPr>
-              <a:t>") +  </a:t>
-            </a:r>
-          </a:p>
-          <a:p>
-            <a:r>
-              <a:rPr lang="es-ES" dirty="0" err="1">
-                <a:latin typeface="Trebuchet MS (Títulos)"/>
-              </a:rPr>
-              <a:t>labs</a:t>
-            </a:r>
-            <a:r>
-              <a:rPr lang="es-ES" dirty="0">
-                <a:latin typeface="Trebuchet MS (Títulos)"/>
-              </a:rPr>
-              <a:t>(x = NULL, y = "Número de frases", </a:t>
-            </a:r>
-            <a:r>
-              <a:rPr lang="es-ES" dirty="0" err="1">
-                <a:latin typeface="Trebuchet MS (Títulos)"/>
-              </a:rPr>
-              <a:t>title</a:t>
-            </a:r>
-            <a:r>
-              <a:rPr lang="es-ES" dirty="0">
-                <a:latin typeface="Trebuchet MS (Títulos)"/>
-              </a:rPr>
-              <a:t> = "Frases que contienen palabras clave") + </a:t>
-            </a:r>
-          </a:p>
-          <a:p>
-            <a:r>
-              <a:rPr lang="es-ES" dirty="0">
-                <a:latin typeface="Trebuchet MS (Títulos)"/>
-              </a:rPr>
-              <a:t> </a:t>
-            </a:r>
-            <a:r>
-              <a:rPr lang="es-ES" dirty="0" err="1">
-                <a:latin typeface="Trebuchet MS (Títulos)"/>
-              </a:rPr>
-              <a:t>theme</a:t>
-            </a:r>
-            <a:r>
-              <a:rPr lang="es-ES" dirty="0">
-                <a:latin typeface="Trebuchet MS (Títulos)"/>
-              </a:rPr>
-              <a:t>(</a:t>
-            </a:r>
-            <a:r>
-              <a:rPr lang="es-ES" dirty="0" err="1">
-                <a:latin typeface="Trebuchet MS (Títulos)"/>
-              </a:rPr>
-              <a:t>axis.text.x</a:t>
-            </a:r>
-            <a:r>
-              <a:rPr lang="es-ES" dirty="0">
-                <a:latin typeface="Trebuchet MS (Títulos)"/>
-              </a:rPr>
-              <a:t> = </a:t>
-            </a:r>
-            <a:r>
-              <a:rPr lang="es-ES" dirty="0" err="1">
-                <a:latin typeface="Trebuchet MS (Títulos)"/>
-              </a:rPr>
-              <a:t>element_text</a:t>
-            </a:r>
-            <a:r>
-              <a:rPr lang="es-ES" dirty="0">
-                <a:latin typeface="Trebuchet MS (Títulos)"/>
-              </a:rPr>
-              <a:t>(angle = 45, </a:t>
-            </a:r>
-            <a:r>
-              <a:rPr lang="es-ES" dirty="0" err="1">
-                <a:latin typeface="Trebuchet MS (Títulos)"/>
-              </a:rPr>
-              <a:t>hjust</a:t>
-            </a:r>
-            <a:r>
-              <a:rPr lang="es-ES" dirty="0">
-                <a:latin typeface="Trebuchet MS (Títulos)"/>
-              </a:rPr>
-              <a:t> = 1))</a:t>
-            </a:r>
-          </a:p>
-        </p:txBody>
-      </p:sp>
+          </a:blip>
+          <a:stretch>
+            <a:fillRect/>
+          </a:stretch>
+        </p:blipFill>
+        <p:spPr>
+          <a:xfrm>
+            <a:off x="0" y="0"/>
+            <a:ext cx="12191999" cy="6858994"/>
+          </a:xfrm>
+        </p:spPr>
+      </p:pic>
     </p:spTree>
     <p:extLst>
       <p:ext uri="{BB962C8B-B14F-4D97-AF65-F5344CB8AC3E}">
-        <p14:creationId xmlns:p14="http://schemas.microsoft.com/office/powerpoint/2010/main" val="4108334512"/>
+        <p14:creationId xmlns:p14="http://schemas.microsoft.com/office/powerpoint/2010/main" val="4150133507"/>
       </p:ext>
     </p:extLst>
   </p:cSld>
@@ -8134,7 +7930,7 @@
           <p:cNvPr id="2" name="Título 1">
             <a:extLst>
               <a:ext uri="{FF2B5EF4-FFF2-40B4-BE49-F238E27FC236}">
-                <a16:creationId xmlns:a16="http://schemas.microsoft.com/office/drawing/2014/main" id="{C9138EC7-7308-4EB9-9D5A-7C3F95ED1BF3}"/>
+                <a16:creationId xmlns:a16="http://schemas.microsoft.com/office/drawing/2014/main" id="{B62330A1-FD1E-4F20-DACF-3AFD8FE85805}"/>
               </a:ext>
             </a:extLst>
           </p:cNvPr>
@@ -8147,14 +7943,31 @@
         </p:nvSpPr>
         <p:spPr/>
         <p:txBody>
-          <a:bodyPr/>
+          <a:bodyPr>
+            <a:normAutofit/>
+          </a:bodyPr>
           <a:lstStyle/>
           <a:p>
-            <a:r>
-              <a:rPr lang="es-MX" sz="2800" dirty="0"/>
-              <a:t>Sintaxis</a:t>
-            </a:r>
-            <a:endParaRPr lang="es-CO" dirty="0"/>
+            <a:pPr marL="228600" indent="-228600">
+              <a:spcBef>
+                <a:spcPts val="1000"/>
+              </a:spcBef>
+              <a:buFont typeface="Arial" panose="020B0604020202020204" pitchFamily="34" charset="0"/>
+              <a:buChar char="•"/>
+            </a:pPr>
+            <a:r>
+              <a:rPr lang="es-MX" sz="2800" dirty="0">
+                <a:latin typeface="Trebuchet MS (Títulos)"/>
+                <a:ea typeface="+mn-ea"/>
+                <a:cs typeface="+mn-cs"/>
+              </a:rPr>
+              <a:t>La vida es una batalla</a:t>
+            </a:r>
+            <a:endParaRPr lang="es-CO" sz="2800" dirty="0">
+              <a:latin typeface="Trebuchet MS (Títulos)"/>
+              <a:ea typeface="+mn-ea"/>
+              <a:cs typeface="+mn-cs"/>
+            </a:endParaRPr>
           </a:p>
         </p:txBody>
       </p:sp>
@@ -8163,7 +7976,7 @@
           <p:cNvPr id="3" name="Marcador de contenido 2">
             <a:extLst>
               <a:ext uri="{FF2B5EF4-FFF2-40B4-BE49-F238E27FC236}">
-                <a16:creationId xmlns:a16="http://schemas.microsoft.com/office/drawing/2014/main" id="{0D5A222B-9DB1-4493-B234-00939271FEC1}"/>
+                <a16:creationId xmlns:a16="http://schemas.microsoft.com/office/drawing/2014/main" id="{F3F7B452-6521-1B77-5284-834AF63F229B}"/>
               </a:ext>
             </a:extLst>
           </p:cNvPr>
@@ -8177,160 +7990,36 @@
         <p:spPr/>
         <p:txBody>
           <a:bodyPr>
-            <a:normAutofit fontScale="40000" lnSpcReduction="20000"/>
+            <a:normAutofit/>
           </a:bodyPr>
           <a:lstStyle/>
           <a:p>
-            <a:r>
-              <a:rPr lang="es-ES" sz="4400" dirty="0">
+            <a:pPr algn="l"/>
+            <a:r>
+              <a:rPr lang="es-ES" dirty="0">
                 <a:latin typeface="Trebuchet MS (Títulos)"/>
               </a:rPr>
-              <a:t>El código utiliza la librería </a:t>
-            </a:r>
-            <a:r>
-              <a:rPr lang="es-ES" sz="4400" b="1" dirty="0">
+              <a:t>Imaginen que nuestra vida es como un campo de batalla, lleno de desafíos y obstáculos que debemos superar. En este "campo", el saber es nuestra arma secreta. Cuando enfrentamos problemas o decisiones difíciles, el conocimiento nos proporciona una guía valiosa.</a:t>
+            </a:r>
+          </a:p>
+          <a:p>
+            <a:pPr algn="l"/>
+            <a:r>
+              <a:rPr lang="es-ES" dirty="0">
                 <a:latin typeface="Trebuchet MS (Títulos)"/>
               </a:rPr>
-              <a:t>ggplot2</a:t>
-            </a:r>
-            <a:r>
-              <a:rPr lang="es-ES" sz="4400" dirty="0">
-                <a:latin typeface="Trebuchet MS (Títulos)"/>
-              </a:rPr>
-              <a:t> en R para crear un gráfico de barras a partir de los datos proporcionados en el objeto </a:t>
-            </a:r>
-            <a:r>
-              <a:rPr lang="es-ES" sz="4400" dirty="0" err="1">
-                <a:latin typeface="Trebuchet MS (Títulos)"/>
-              </a:rPr>
-              <a:t>datos_grafico</a:t>
-            </a:r>
-            <a:r>
-              <a:rPr lang="es-ES" sz="4400" dirty="0">
-                <a:latin typeface="Trebuchet MS (Títulos)"/>
-              </a:rPr>
-              <a:t>. Se asigna la columna "Palabra" al eje x y la columna "Numero" al eje y. Además, se utiliza la columna "Palabra" para definir el color de las barras.</a:t>
-            </a:r>
-          </a:p>
-          <a:p>
-            <a:r>
-              <a:rPr lang="es-ES" sz="4400" dirty="0">
-                <a:latin typeface="Trebuchet MS (Títulos)"/>
-              </a:rPr>
-              <a:t>Se agrega una capa al gráfico utilizando </a:t>
-            </a:r>
-            <a:r>
-              <a:rPr lang="es-ES" sz="4400" b="1" dirty="0" err="1">
-                <a:latin typeface="Trebuchet MS (Títulos)"/>
-              </a:rPr>
-              <a:t>geom_bar</a:t>
-            </a:r>
-            <a:r>
-              <a:rPr lang="es-ES" sz="4400" dirty="0">
-                <a:latin typeface="Trebuchet MS (Títulos)"/>
-              </a:rPr>
-              <a:t>, lo que crea un gráfico de barras. El argumento </a:t>
-            </a:r>
-            <a:r>
-              <a:rPr lang="es-ES" sz="4400" dirty="0" err="1">
-                <a:latin typeface="Trebuchet MS (Títulos)"/>
-              </a:rPr>
-              <a:t>stat</a:t>
-            </a:r>
-            <a:r>
-              <a:rPr lang="es-ES" sz="4400" dirty="0">
-                <a:latin typeface="Trebuchet MS (Títulos)"/>
-              </a:rPr>
-              <a:t> = "</a:t>
-            </a:r>
-            <a:r>
-              <a:rPr lang="es-ES" sz="4400" dirty="0" err="1">
-                <a:latin typeface="Trebuchet MS (Títulos)"/>
-              </a:rPr>
-              <a:t>identity</a:t>
-            </a:r>
-            <a:r>
-              <a:rPr lang="es-ES" sz="4400" dirty="0">
-                <a:latin typeface="Trebuchet MS (Títulos)"/>
-              </a:rPr>
-              <a:t>" indica que las alturas de las barras se toman directamente de los datos proporcionados en "Numero", en lugar de calcular frecuencias. El argumento color = "</a:t>
-            </a:r>
-            <a:r>
-              <a:rPr lang="es-ES" sz="4400" dirty="0" err="1">
-                <a:latin typeface="Trebuchet MS (Títulos)"/>
-              </a:rPr>
-              <a:t>black</a:t>
-            </a:r>
-            <a:r>
-              <a:rPr lang="es-ES" sz="4400" dirty="0">
-                <a:latin typeface="Trebuchet MS (Títulos)"/>
-              </a:rPr>
-              <a:t>" define el color del borde de las barras, que es negro.</a:t>
-            </a:r>
-          </a:p>
-          <a:p>
-            <a:r>
-              <a:rPr lang="es-ES" sz="4400" dirty="0">
-                <a:latin typeface="Trebuchet MS (Títulos)"/>
-              </a:rPr>
-              <a:t>Se agregan etiquetas al gráfico mediante </a:t>
-            </a:r>
-            <a:r>
-              <a:rPr lang="es-ES" sz="4400" b="1" dirty="0" err="1">
-                <a:latin typeface="Trebuchet MS (Títulos)"/>
-              </a:rPr>
-              <a:t>labs</a:t>
-            </a:r>
-            <a:r>
-              <a:rPr lang="es-ES" sz="4400" dirty="0">
-                <a:latin typeface="Trebuchet MS (Títulos)"/>
-              </a:rPr>
-              <a:t>. La etiqueta del eje x se omite (x = NULL), y se asigna la etiqueta "Número de frases" al eje y. Además, se asigna el título "Frases que contienen palabras clave" al gráfico.</a:t>
-            </a:r>
-          </a:p>
-          <a:p>
-            <a:r>
-              <a:rPr lang="es-ES" sz="4400" dirty="0">
-                <a:latin typeface="Trebuchet MS (Títulos)"/>
-              </a:rPr>
-              <a:t>Se personaliza el tema del gráfico utilizando </a:t>
-            </a:r>
-            <a:r>
-              <a:rPr lang="es-ES" sz="4400" b="1" dirty="0" err="1">
-                <a:latin typeface="Trebuchet MS (Títulos)"/>
-              </a:rPr>
-              <a:t>theme</a:t>
-            </a:r>
-            <a:r>
-              <a:rPr lang="es-ES" sz="4400" dirty="0">
-                <a:latin typeface="Trebuchet MS (Títulos)"/>
-              </a:rPr>
-              <a:t>. Se ajusta el ángulo del texto en el eje x a 45 grados (</a:t>
-            </a:r>
-            <a:r>
-              <a:rPr lang="es-ES" sz="4400" dirty="0" err="1">
-                <a:latin typeface="Trebuchet MS (Títulos)"/>
-              </a:rPr>
-              <a:t>angle</a:t>
-            </a:r>
-            <a:r>
-              <a:rPr lang="es-ES" sz="4400" dirty="0">
-                <a:latin typeface="Trebuchet MS (Títulos)"/>
-              </a:rPr>
-              <a:t> = 45) para evitar la superposición de etiquetas y mejorar la legibilidad. El argumento </a:t>
-            </a:r>
-            <a:r>
-              <a:rPr lang="es-ES" sz="4400" dirty="0" err="1">
-                <a:latin typeface="Trebuchet MS (Títulos)"/>
-              </a:rPr>
-              <a:t>hjust</a:t>
-            </a:r>
-            <a:r>
-              <a:rPr lang="es-ES" sz="4400" dirty="0">
-                <a:latin typeface="Trebuchet MS (Títulos)"/>
-              </a:rPr>
-              <a:t> = 1 alinea horizontalmente el texto en el eje x.</a:t>
-            </a:r>
+              <a:t>Conocer a las personas que nos rodean, entender sus puntos de vista y emociones, nos ayuda a establecer conexiones más fuertes y a resolver conflictos. Al comprender sus fortalezas y debilidades, podemos formar equipos sólidos y apoyarnos mutuamente en momentos de necesidad.</a:t>
+            </a:r>
+          </a:p>
+          <a:p>
+            <a:pPr algn="l"/>
+            <a:endParaRPr lang="es-ES" b="0" i="0" dirty="0">
+              <a:effectLst/>
+              <a:latin typeface="Söhne"/>
+            </a:endParaRPr>
+          </a:p>
+          <a:p>
+            <a:endParaRPr lang="es-CO" dirty="0"/>
           </a:p>
           <a:p>
             <a:endParaRPr lang="es-CO" dirty="0"/>
@@ -8340,7 +8029,7 @@
     </p:spTree>
     <p:extLst>
       <p:ext uri="{BB962C8B-B14F-4D97-AF65-F5344CB8AC3E}">
-        <p14:creationId xmlns:p14="http://schemas.microsoft.com/office/powerpoint/2010/main" val="2309351779"/>
+        <p14:creationId xmlns:p14="http://schemas.microsoft.com/office/powerpoint/2010/main" val="2138356295"/>
       </p:ext>
     </p:extLst>
   </p:cSld>
@@ -8367,45 +8056,218 @@
           <a:chExt cx="0" cy="0"/>
         </a:xfrm>
       </p:grpSpPr>
-      <p:pic>
-        <p:nvPicPr>
-          <p:cNvPr id="5" name="Marcador de contenido 4">
+      <p:sp>
+        <p:nvSpPr>
+          <p:cNvPr id="2" name="Título 1">
             <a:extLst>
               <a:ext uri="{FF2B5EF4-FFF2-40B4-BE49-F238E27FC236}">
-                <a16:creationId xmlns:a16="http://schemas.microsoft.com/office/drawing/2014/main" id="{8A711D6B-AC0E-AF2F-2379-6039A51B9994}"/>
+                <a16:creationId xmlns:a16="http://schemas.microsoft.com/office/drawing/2014/main" id="{C9138EC7-7308-4EB9-9D5A-7C3F95ED1BF3}"/>
               </a:ext>
             </a:extLst>
           </p:cNvPr>
-          <p:cNvPicPr>
-            <a:picLocks noGrp="1" noChangeAspect="1"/>
-          </p:cNvPicPr>
-          <p:nvPr>
-            <p:ph idx="1"/>
-          </p:nvPr>
-        </p:nvPicPr>
-        <p:blipFill>
-          <a:blip r:embed="rId2">
+          <p:cNvSpPr>
+            <a:spLocks noGrp="1"/>
+          </p:cNvSpPr>
+          <p:nvPr>
+            <p:ph type="title"/>
+          </p:nvPr>
+        </p:nvSpPr>
+        <p:spPr/>
+        <p:txBody>
+          <a:bodyPr/>
+          <a:lstStyle/>
+          <a:p>
+            <a:r>
+              <a:rPr lang="es-MX" sz="2800" dirty="0"/>
+              <a:t>Sintaxis</a:t>
+            </a:r>
+            <a:endParaRPr lang="es-CO" dirty="0"/>
+          </a:p>
+        </p:txBody>
+      </p:sp>
+      <p:sp>
+        <p:nvSpPr>
+          <p:cNvPr id="3" name="Marcador de contenido 2">
             <a:extLst>
-              <a:ext uri="{28A0092B-C50C-407E-A947-70E740481C1C}">
-                <a14:useLocalDpi xmlns:a14="http://schemas.microsoft.com/office/drawing/2010/main" val="0"/>
+              <a:ext uri="{FF2B5EF4-FFF2-40B4-BE49-F238E27FC236}">
+                <a16:creationId xmlns:a16="http://schemas.microsoft.com/office/drawing/2014/main" id="{0D5A222B-9DB1-4493-B234-00939271FEC1}"/>
               </a:ext>
             </a:extLst>
-          </a:blip>
-          <a:stretch>
-            <a:fillRect/>
-          </a:stretch>
-        </p:blipFill>
-        <p:spPr>
-          <a:xfrm>
-            <a:off x="0" y="0"/>
-            <a:ext cx="12191999" cy="6858994"/>
-          </a:xfrm>
-        </p:spPr>
-      </p:pic>
+          </p:cNvPr>
+          <p:cNvSpPr>
+            <a:spLocks noGrp="1"/>
+          </p:cNvSpPr>
+          <p:nvPr>
+            <p:ph idx="1"/>
+          </p:nvPr>
+        </p:nvSpPr>
+        <p:spPr/>
+        <p:txBody>
+          <a:bodyPr>
+            <a:normAutofit fontScale="40000" lnSpcReduction="20000"/>
+          </a:bodyPr>
+          <a:lstStyle/>
+          <a:p>
+            <a:r>
+              <a:rPr lang="es-ES" sz="4400" dirty="0">
+                <a:latin typeface="Trebuchet MS (Títulos)"/>
+              </a:rPr>
+              <a:t>El código utiliza la librería </a:t>
+            </a:r>
+            <a:r>
+              <a:rPr lang="es-ES" sz="4400" b="1" dirty="0">
+                <a:latin typeface="Trebuchet MS (Títulos)"/>
+              </a:rPr>
+              <a:t>ggplot2</a:t>
+            </a:r>
+            <a:r>
+              <a:rPr lang="es-ES" sz="4400" dirty="0">
+                <a:latin typeface="Trebuchet MS (Títulos)"/>
+              </a:rPr>
+              <a:t> en R para crear un gráfico de barras a partir de los datos proporcionados en el objeto </a:t>
+            </a:r>
+            <a:r>
+              <a:rPr lang="es-ES" sz="4400" dirty="0" err="1">
+                <a:latin typeface="Trebuchet MS (Títulos)"/>
+              </a:rPr>
+              <a:t>datos_grafico</a:t>
+            </a:r>
+            <a:r>
+              <a:rPr lang="es-ES" sz="4400" dirty="0">
+                <a:latin typeface="Trebuchet MS (Títulos)"/>
+              </a:rPr>
+              <a:t>. Se asigna la columna "Palabra" al eje x y la columna "Numero" al eje y. Además, se utiliza la columna "Palabra" para definir el color de las barras.</a:t>
+            </a:r>
+          </a:p>
+          <a:p>
+            <a:r>
+              <a:rPr lang="es-ES" sz="4400" dirty="0">
+                <a:latin typeface="Trebuchet MS (Títulos)"/>
+              </a:rPr>
+              <a:t>Se agrega una capa al gráfico utilizando </a:t>
+            </a:r>
+            <a:r>
+              <a:rPr lang="es-ES" sz="4400" b="1" dirty="0" err="1">
+                <a:latin typeface="Trebuchet MS (Títulos)"/>
+              </a:rPr>
+              <a:t>geom_bar</a:t>
+            </a:r>
+            <a:r>
+              <a:rPr lang="es-ES" sz="4400" dirty="0">
+                <a:latin typeface="Trebuchet MS (Títulos)"/>
+              </a:rPr>
+              <a:t>, lo que crea un gráfico de barras. El argumento </a:t>
+            </a:r>
+            <a:r>
+              <a:rPr lang="es-ES" sz="4400" dirty="0" err="1">
+                <a:latin typeface="Trebuchet MS (Títulos)"/>
+              </a:rPr>
+              <a:t>stat</a:t>
+            </a:r>
+            <a:r>
+              <a:rPr lang="es-ES" sz="4400" dirty="0">
+                <a:latin typeface="Trebuchet MS (Títulos)"/>
+              </a:rPr>
+              <a:t> = "</a:t>
+            </a:r>
+            <a:r>
+              <a:rPr lang="es-ES" sz="4400" dirty="0" err="1">
+                <a:latin typeface="Trebuchet MS (Títulos)"/>
+              </a:rPr>
+              <a:t>identity</a:t>
+            </a:r>
+            <a:r>
+              <a:rPr lang="es-ES" sz="4400" dirty="0">
+                <a:latin typeface="Trebuchet MS (Títulos)"/>
+              </a:rPr>
+              <a:t>" indica que las alturas de las barras se toman directamente de los datos proporcionados en "Numero", en lugar de calcular frecuencias. El argumento color = "</a:t>
+            </a:r>
+            <a:r>
+              <a:rPr lang="es-ES" sz="4400" dirty="0" err="1">
+                <a:latin typeface="Trebuchet MS (Títulos)"/>
+              </a:rPr>
+              <a:t>black</a:t>
+            </a:r>
+            <a:r>
+              <a:rPr lang="es-ES" sz="4400" dirty="0">
+                <a:latin typeface="Trebuchet MS (Títulos)"/>
+              </a:rPr>
+              <a:t>" define el color del borde de las barras, que es negro.</a:t>
+            </a:r>
+          </a:p>
+          <a:p>
+            <a:r>
+              <a:rPr lang="es-ES" sz="4400" dirty="0">
+                <a:latin typeface="Trebuchet MS (Títulos)"/>
+              </a:rPr>
+              <a:t>Se agregan etiquetas al gráfico mediante </a:t>
+            </a:r>
+            <a:r>
+              <a:rPr lang="es-ES" sz="4400" b="1" dirty="0" err="1">
+                <a:latin typeface="Trebuchet MS (Títulos)"/>
+              </a:rPr>
+              <a:t>labs</a:t>
+            </a:r>
+            <a:r>
+              <a:rPr lang="es-ES" sz="4400" dirty="0">
+                <a:latin typeface="Trebuchet MS (Títulos)"/>
+              </a:rPr>
+              <a:t>. La etiqueta del eje x se omite (x = NULL), y se asigna la etiqueta "Número de frases" al eje y. Además, se asigna el título "Frases que contienen palabras clave" al gráfico.</a:t>
+            </a:r>
+          </a:p>
+          <a:p>
+            <a:r>
+              <a:rPr lang="es-ES" sz="4400" dirty="0">
+                <a:latin typeface="Trebuchet MS (Títulos)"/>
+              </a:rPr>
+              <a:t>Se personaliza el tema del gráfico utilizando </a:t>
+            </a:r>
+            <a:r>
+              <a:rPr lang="es-ES" sz="4400" b="1" dirty="0" err="1">
+                <a:latin typeface="Trebuchet MS (Títulos)"/>
+              </a:rPr>
+              <a:t>theme</a:t>
+            </a:r>
+            <a:r>
+              <a:rPr lang="es-ES" sz="4400" dirty="0">
+                <a:latin typeface="Trebuchet MS (Títulos)"/>
+              </a:rPr>
+              <a:t>. Se ajusta el ángulo del texto en el eje x a 45 grados (</a:t>
+            </a:r>
+            <a:r>
+              <a:rPr lang="es-ES" sz="4400" dirty="0" err="1">
+                <a:latin typeface="Trebuchet MS (Títulos)"/>
+              </a:rPr>
+              <a:t>angle</a:t>
+            </a:r>
+            <a:r>
+              <a:rPr lang="es-ES" sz="4400" dirty="0">
+                <a:latin typeface="Trebuchet MS (Títulos)"/>
+              </a:rPr>
+              <a:t> = 45) para evitar la superposición de etiquetas y mejorar la legibilidad. El argumento </a:t>
+            </a:r>
+            <a:r>
+              <a:rPr lang="es-ES" sz="4400" dirty="0" err="1">
+                <a:latin typeface="Trebuchet MS (Títulos)"/>
+              </a:rPr>
+              <a:t>hjust</a:t>
+            </a:r>
+            <a:r>
+              <a:rPr lang="es-ES" sz="4400" dirty="0">
+                <a:latin typeface="Trebuchet MS (Títulos)"/>
+              </a:rPr>
+              <a:t> = 1 alinea horizontalmente el texto en el eje x.</a:t>
+            </a:r>
+          </a:p>
+          <a:p>
+            <a:endParaRPr lang="es-CO" dirty="0"/>
+          </a:p>
+        </p:txBody>
+      </p:sp>
     </p:spTree>
     <p:extLst>
       <p:ext uri="{BB962C8B-B14F-4D97-AF65-F5344CB8AC3E}">
-        <p14:creationId xmlns:p14="http://schemas.microsoft.com/office/powerpoint/2010/main" val="4150133507"/>
+        <p14:creationId xmlns:p14="http://schemas.microsoft.com/office/powerpoint/2010/main" val="2309351779"/>
       </p:ext>
     </p:extLst>
   </p:cSld>
@@ -9755,7 +9617,7 @@
           <p:cNvPr id="2" name="Título 1">
             <a:extLst>
               <a:ext uri="{FF2B5EF4-FFF2-40B4-BE49-F238E27FC236}">
-                <a16:creationId xmlns:a16="http://schemas.microsoft.com/office/drawing/2014/main" id="{9DD96EEA-FD12-4840-9623-1D382B3B1217}"/>
+                <a16:creationId xmlns:a16="http://schemas.microsoft.com/office/drawing/2014/main" id="{D778969E-AFAA-1D45-7AD9-D78D32FA8AEE}"/>
               </a:ext>
             </a:extLst>
           </p:cNvPr>
@@ -9774,21 +9636,10 @@
           <a:lstStyle/>
           <a:p>
             <a:r>
-              <a:rPr lang="es-ES" sz="2800" dirty="0">
-                <a:latin typeface="Trebuchet MS (Títulos)"/>
-              </a:rPr>
-              <a:t>Librería </a:t>
-            </a:r>
-            <a:r>
-              <a:rPr lang="es-ES" sz="2800" b="0" i="0" dirty="0">
-                <a:effectLst/>
-                <a:latin typeface="Trebuchet MS (Títulos)"/>
-              </a:rPr>
-              <a:t>ggplot2</a:t>
-            </a:r>
-            <a:endParaRPr lang="es-CO" sz="2800" dirty="0">
-              <a:latin typeface="Trebuchet MS (Títulos)"/>
-            </a:endParaRPr>
+              <a:rPr lang="es-MX" sz="2800" dirty="0"/>
+              <a:t>Palabra clave </a:t>
+            </a:r>
+            <a:endParaRPr lang="es-CO" sz="2800" dirty="0"/>
           </a:p>
         </p:txBody>
       </p:sp>
@@ -9797,7 +9648,7 @@
           <p:cNvPr id="3" name="Marcador de contenido 2">
             <a:extLst>
               <a:ext uri="{FF2B5EF4-FFF2-40B4-BE49-F238E27FC236}">
-                <a16:creationId xmlns:a16="http://schemas.microsoft.com/office/drawing/2014/main" id="{E6D5669C-089E-8FFC-6554-7E1E2200D050}"/>
+                <a16:creationId xmlns:a16="http://schemas.microsoft.com/office/drawing/2014/main" id="{5440D358-AE7B-1376-9EBA-C8ED3DB43F6C}"/>
               </a:ext>
             </a:extLst>
           </p:cNvPr>
@@ -9808,176 +9659,56 @@
             <p:ph idx="1"/>
           </p:nvPr>
         </p:nvSpPr>
-        <p:spPr>
-          <a:xfrm>
-            <a:off x="680321" y="2336873"/>
-            <a:ext cx="9613861" cy="4156206"/>
-          </a:xfrm>
-        </p:spPr>
+        <p:spPr/>
         <p:txBody>
           <a:bodyPr>
             <a:normAutofit/>
           </a:bodyPr>
           <a:lstStyle/>
           <a:p>
-            <a:pPr marL="0" indent="0">
-              <a:buNone/>
-            </a:pPr>
             <a:r>
               <a:rPr lang="es-ES" b="0" i="0" dirty="0">
                 <a:effectLst/>
                 <a:latin typeface="Trebuchet MS (Títulos)"/>
               </a:rPr>
-              <a:t>ggplot2 es un sistema para crear gráficos declarativamente, basado en </a:t>
-            </a:r>
-            <a:r>
-              <a:rPr lang="es-ES" b="0" i="0" u="sng" dirty="0" err="1">
-                <a:effectLst/>
-                <a:latin typeface="Trebuchet MS (Títulos)"/>
-                <a:hlinkClick r:id="rId2">
-                  <a:extLst>
-                    <a:ext uri="{A12FA001-AC4F-418D-AE19-62706E023703}">
-                      <ahyp:hlinkClr xmlns:ahyp="http://schemas.microsoft.com/office/drawing/2018/hyperlinkcolor" val="tx"/>
-                    </a:ext>
-                  </a:extLst>
-                </a:hlinkClick>
-              </a:rPr>
-              <a:t>The</a:t>
-            </a:r>
-            <a:r>
-              <a:rPr lang="es-ES" b="0" i="0" u="sng" dirty="0">
-                <a:effectLst/>
-                <a:latin typeface="Trebuchet MS (Títulos)"/>
-                <a:hlinkClick r:id="rId2">
-                  <a:extLst>
-                    <a:ext uri="{A12FA001-AC4F-418D-AE19-62706E023703}">
-                      <ahyp:hlinkClr xmlns:ahyp="http://schemas.microsoft.com/office/drawing/2018/hyperlinkcolor" val="tx"/>
-                    </a:ext>
-                  </a:extLst>
-                </a:hlinkClick>
-              </a:rPr>
-              <a:t> </a:t>
-            </a:r>
-            <a:r>
-              <a:rPr lang="es-ES" b="0" i="0" u="sng" dirty="0" err="1">
-                <a:effectLst/>
-                <a:latin typeface="Trebuchet MS (Títulos)"/>
-                <a:hlinkClick r:id="rId2">
-                  <a:extLst>
-                    <a:ext uri="{A12FA001-AC4F-418D-AE19-62706E023703}">
-                      <ahyp:hlinkClr xmlns:ahyp="http://schemas.microsoft.com/office/drawing/2018/hyperlinkcolor" val="tx"/>
-                    </a:ext>
-                  </a:extLst>
-                </a:hlinkClick>
-              </a:rPr>
-              <a:t>Grammar</a:t>
-            </a:r>
-            <a:r>
-              <a:rPr lang="es-ES" b="0" i="0" u="sng" dirty="0">
-                <a:effectLst/>
-                <a:latin typeface="Trebuchet MS (Títulos)"/>
-                <a:hlinkClick r:id="rId2">
-                  <a:extLst>
-                    <a:ext uri="{A12FA001-AC4F-418D-AE19-62706E023703}">
-                      <ahyp:hlinkClr xmlns:ahyp="http://schemas.microsoft.com/office/drawing/2018/hyperlinkcolor" val="tx"/>
-                    </a:ext>
-                  </a:extLst>
-                </a:hlinkClick>
-              </a:rPr>
-              <a:t> </a:t>
-            </a:r>
-            <a:r>
-              <a:rPr lang="es-ES" b="0" i="0" u="sng" dirty="0" err="1">
-                <a:effectLst/>
-                <a:latin typeface="Trebuchet MS (Títulos)"/>
-                <a:hlinkClick r:id="rId2">
-                  <a:extLst>
-                    <a:ext uri="{A12FA001-AC4F-418D-AE19-62706E023703}">
-                      <ahyp:hlinkClr xmlns:ahyp="http://schemas.microsoft.com/office/drawing/2018/hyperlinkcolor" val="tx"/>
-                    </a:ext>
-                  </a:extLst>
-                </a:hlinkClick>
-              </a:rPr>
-              <a:t>of</a:t>
-            </a:r>
-            <a:r>
-              <a:rPr lang="es-ES" b="0" i="0" u="sng" dirty="0">
-                <a:effectLst/>
-                <a:latin typeface="Trebuchet MS (Títulos)"/>
-                <a:hlinkClick r:id="rId2">
-                  <a:extLst>
-                    <a:ext uri="{A12FA001-AC4F-418D-AE19-62706E023703}">
-                      <ahyp:hlinkClr xmlns:ahyp="http://schemas.microsoft.com/office/drawing/2018/hyperlinkcolor" val="tx"/>
-                    </a:ext>
-                  </a:extLst>
-                </a:hlinkClick>
-              </a:rPr>
-              <a:t> </a:t>
-            </a:r>
-            <a:r>
-              <a:rPr lang="es-ES" b="0" i="0" u="sng" dirty="0" err="1">
-                <a:effectLst/>
-                <a:latin typeface="Trebuchet MS (Títulos)"/>
-                <a:hlinkClick r:id="rId2">
-                  <a:extLst>
-                    <a:ext uri="{A12FA001-AC4F-418D-AE19-62706E023703}">
-                      <ahyp:hlinkClr xmlns:ahyp="http://schemas.microsoft.com/office/drawing/2018/hyperlinkcolor" val="tx"/>
-                    </a:ext>
-                  </a:extLst>
-                </a:hlinkClick>
-              </a:rPr>
-              <a:t>Graphics</a:t>
-            </a:r>
+              <a:t>Conocer nuestras propias habilidades y limitaciones nos permite tomar decisiones más acertadas. Saber qué somos buenos nos da confianza para enfrentar nuevos desafíos, mientras que reconocer nuestras debilidades nos permite trabajar en ellas y mejorar.</a:t>
+            </a:r>
+            <a:endParaRPr lang="es-ES" dirty="0">
+              <a:latin typeface="Trebuchet MS (Títulos)"/>
+            </a:endParaRPr>
+          </a:p>
+          <a:p>
+            <a:pPr algn="l"/>
             <a:r>
               <a:rPr lang="es-ES" b="0" i="0" dirty="0">
                 <a:effectLst/>
                 <a:latin typeface="Trebuchet MS (Títulos)"/>
               </a:rPr>
-              <a:t> . Usted proporciona los datos, le dice a ggplot2 cómo asignar variables a la estética, qué primitivas gráficas usar y se ocupa de los detalles.</a:t>
-            </a:r>
-          </a:p>
-          <a:p>
-            <a:pPr marL="0" indent="0">
-              <a:buNone/>
-            </a:pPr>
-            <a:endParaRPr lang="es-ES" dirty="0">
-              <a:latin typeface="Trebuchet MS (Títulos)"/>
+              <a:t>El conocimiento del entorno en el que nos desenvolvemos también es esencial. Saber cómo funcionan las cosas, las reglas del juego y las oportunidades que se presentan nos da una ventaja para tomar decisiones inteligentes y aprovechar las situaciones a nuestro favor.</a:t>
+            </a:r>
+          </a:p>
+          <a:p>
+            <a:endParaRPr lang="es-ES" b="0" i="0" dirty="0">
+              <a:effectLst/>
+              <a:latin typeface="Söhne"/>
             </a:endParaRPr>
           </a:p>
           <a:p>
-            <a:pPr marL="0" indent="0">
-              <a:buNone/>
-            </a:pPr>
-            <a:r>
-              <a:rPr lang="es-ES" b="0" i="0" dirty="0">
-                <a:effectLst/>
-                <a:latin typeface="Trebuchet MS (Títulos)"/>
-              </a:rPr>
-              <a:t> librería ggplot2:</a:t>
-            </a:r>
-          </a:p>
-          <a:p>
-            <a:r>
-              <a:rPr lang="es-ES" b="0" i="0" dirty="0" err="1">
-                <a:effectLst/>
-                <a:latin typeface="Trebuchet MS (Títulos)"/>
-              </a:rPr>
-              <a:t>instalar.paquetes</a:t>
-            </a:r>
-            <a:r>
-              <a:rPr lang="es-ES" b="0" i="0" dirty="0">
-                <a:effectLst/>
-                <a:latin typeface="Trebuchet MS (Títulos)"/>
-              </a:rPr>
-              <a:t>("ggplot2")</a:t>
-            </a:r>
+            <a:pPr algn="l"/>
+            <a:endParaRPr lang="es-ES" b="0" i="0" dirty="0">
+              <a:effectLst/>
+              <a:latin typeface="Söhne"/>
+            </a:endParaRPr>
+          </a:p>
+          <a:p>
+            <a:endParaRPr lang="es-CO" dirty="0"/>
           </a:p>
         </p:txBody>
       </p:sp>
     </p:spTree>
     <p:extLst>
       <p:ext uri="{BB962C8B-B14F-4D97-AF65-F5344CB8AC3E}">
-        <p14:creationId xmlns:p14="http://schemas.microsoft.com/office/powerpoint/2010/main" val="3556703902"/>
+        <p14:creationId xmlns:p14="http://schemas.microsoft.com/office/powerpoint/2010/main" val="782508922"/>
       </p:ext>
     </p:extLst>
   </p:cSld>
@@ -10009,7 +9740,7 @@
           <p:cNvPr id="2" name="Título 1">
             <a:extLst>
               <a:ext uri="{FF2B5EF4-FFF2-40B4-BE49-F238E27FC236}">
-                <a16:creationId xmlns:a16="http://schemas.microsoft.com/office/drawing/2014/main" id="{D778969E-AFAA-1D45-7AD9-D78D32FA8AEE}"/>
+                <a16:creationId xmlns:a16="http://schemas.microsoft.com/office/drawing/2014/main" id="{9DD96EEA-FD12-4840-9623-1D382B3B1217}"/>
               </a:ext>
             </a:extLst>
           </p:cNvPr>
@@ -10028,10 +9759,21 @@
           <a:lstStyle/>
           <a:p>
             <a:r>
-              <a:rPr lang="es-MX" sz="2800" dirty="0"/>
-              <a:t>Palabra clave </a:t>
-            </a:r>
-            <a:endParaRPr lang="es-CO" sz="2800" dirty="0"/>
+              <a:rPr lang="es-ES" sz="2800" dirty="0">
+                <a:latin typeface="Trebuchet MS (Títulos)"/>
+              </a:rPr>
+              <a:t>Librería </a:t>
+            </a:r>
+            <a:r>
+              <a:rPr lang="es-ES" sz="2800" b="0" i="0" dirty="0">
+                <a:effectLst/>
+                <a:latin typeface="Trebuchet MS (Títulos)"/>
+              </a:rPr>
+              <a:t>ggplot2</a:t>
+            </a:r>
+            <a:endParaRPr lang="es-CO" sz="2800" dirty="0">
+              <a:latin typeface="Trebuchet MS (Títulos)"/>
+            </a:endParaRPr>
           </a:p>
         </p:txBody>
       </p:sp>
@@ -10040,7 +9782,7 @@
           <p:cNvPr id="3" name="Marcador de contenido 2">
             <a:extLst>
               <a:ext uri="{FF2B5EF4-FFF2-40B4-BE49-F238E27FC236}">
-                <a16:creationId xmlns:a16="http://schemas.microsoft.com/office/drawing/2014/main" id="{5440D358-AE7B-1376-9EBA-C8ED3DB43F6C}"/>
+                <a16:creationId xmlns:a16="http://schemas.microsoft.com/office/drawing/2014/main" id="{E6D5669C-089E-8FFC-6554-7E1E2200D050}"/>
               </a:ext>
             </a:extLst>
           </p:cNvPr>
@@ -10051,56 +9793,176 @@
             <p:ph idx="1"/>
           </p:nvPr>
         </p:nvSpPr>
-        <p:spPr/>
+        <p:spPr>
+          <a:xfrm>
+            <a:off x="680321" y="2336873"/>
+            <a:ext cx="9613861" cy="4156206"/>
+          </a:xfrm>
+        </p:spPr>
         <p:txBody>
           <a:bodyPr>
             <a:normAutofit/>
           </a:bodyPr>
           <a:lstStyle/>
           <a:p>
+            <a:pPr marL="0" indent="0">
+              <a:buNone/>
+            </a:pPr>
             <a:r>
               <a:rPr lang="es-ES" b="0" i="0" dirty="0">
                 <a:effectLst/>
                 <a:latin typeface="Trebuchet MS (Títulos)"/>
               </a:rPr>
-              <a:t>Conocer nuestras propias habilidades y limitaciones nos permite tomar decisiones más acertadas. Saber qué somos buenos nos da confianza para enfrentar nuevos desafíos, mientras que reconocer nuestras debilidades nos permite trabajar en ellas y mejorar.</a:t>
-            </a:r>
+              <a:t>ggplot2 es un sistema para crear gráficos declarativamente, basado en </a:t>
+            </a:r>
+            <a:r>
+              <a:rPr lang="es-ES" b="0" i="0" u="sng" dirty="0" err="1">
+                <a:effectLst/>
+                <a:latin typeface="Trebuchet MS (Títulos)"/>
+                <a:hlinkClick r:id="rId2">
+                  <a:extLst>
+                    <a:ext uri="{A12FA001-AC4F-418D-AE19-62706E023703}">
+                      <ahyp:hlinkClr xmlns:ahyp="http://schemas.microsoft.com/office/drawing/2018/hyperlinkcolor" val="tx"/>
+                    </a:ext>
+                  </a:extLst>
+                </a:hlinkClick>
+              </a:rPr>
+              <a:t>The</a:t>
+            </a:r>
+            <a:r>
+              <a:rPr lang="es-ES" b="0" i="0" u="sng" dirty="0">
+                <a:effectLst/>
+                <a:latin typeface="Trebuchet MS (Títulos)"/>
+                <a:hlinkClick r:id="rId2">
+                  <a:extLst>
+                    <a:ext uri="{A12FA001-AC4F-418D-AE19-62706E023703}">
+                      <ahyp:hlinkClr xmlns:ahyp="http://schemas.microsoft.com/office/drawing/2018/hyperlinkcolor" val="tx"/>
+                    </a:ext>
+                  </a:extLst>
+                </a:hlinkClick>
+              </a:rPr>
+              <a:t> </a:t>
+            </a:r>
+            <a:r>
+              <a:rPr lang="es-ES" b="0" i="0" u="sng" dirty="0" err="1">
+                <a:effectLst/>
+                <a:latin typeface="Trebuchet MS (Títulos)"/>
+                <a:hlinkClick r:id="rId2">
+                  <a:extLst>
+                    <a:ext uri="{A12FA001-AC4F-418D-AE19-62706E023703}">
+                      <ahyp:hlinkClr xmlns:ahyp="http://schemas.microsoft.com/office/drawing/2018/hyperlinkcolor" val="tx"/>
+                    </a:ext>
+                  </a:extLst>
+                </a:hlinkClick>
+              </a:rPr>
+              <a:t>Grammar</a:t>
+            </a:r>
+            <a:r>
+              <a:rPr lang="es-ES" b="0" i="0" u="sng" dirty="0">
+                <a:effectLst/>
+                <a:latin typeface="Trebuchet MS (Títulos)"/>
+                <a:hlinkClick r:id="rId2">
+                  <a:extLst>
+                    <a:ext uri="{A12FA001-AC4F-418D-AE19-62706E023703}">
+                      <ahyp:hlinkClr xmlns:ahyp="http://schemas.microsoft.com/office/drawing/2018/hyperlinkcolor" val="tx"/>
+                    </a:ext>
+                  </a:extLst>
+                </a:hlinkClick>
+              </a:rPr>
+              <a:t> </a:t>
+            </a:r>
+            <a:r>
+              <a:rPr lang="es-ES" b="0" i="0" u="sng" dirty="0" err="1">
+                <a:effectLst/>
+                <a:latin typeface="Trebuchet MS (Títulos)"/>
+                <a:hlinkClick r:id="rId2">
+                  <a:extLst>
+                    <a:ext uri="{A12FA001-AC4F-418D-AE19-62706E023703}">
+                      <ahyp:hlinkClr xmlns:ahyp="http://schemas.microsoft.com/office/drawing/2018/hyperlinkcolor" val="tx"/>
+                    </a:ext>
+                  </a:extLst>
+                </a:hlinkClick>
+              </a:rPr>
+              <a:t>of</a:t>
+            </a:r>
+            <a:r>
+              <a:rPr lang="es-ES" b="0" i="0" u="sng" dirty="0">
+                <a:effectLst/>
+                <a:latin typeface="Trebuchet MS (Títulos)"/>
+                <a:hlinkClick r:id="rId2">
+                  <a:extLst>
+                    <a:ext uri="{A12FA001-AC4F-418D-AE19-62706E023703}">
+                      <ahyp:hlinkClr xmlns:ahyp="http://schemas.microsoft.com/office/drawing/2018/hyperlinkcolor" val="tx"/>
+                    </a:ext>
+                  </a:extLst>
+                </a:hlinkClick>
+              </a:rPr>
+              <a:t> </a:t>
+            </a:r>
+            <a:r>
+              <a:rPr lang="es-ES" b="0" i="0" u="sng" dirty="0" err="1">
+                <a:effectLst/>
+                <a:latin typeface="Trebuchet MS (Títulos)"/>
+                <a:hlinkClick r:id="rId2">
+                  <a:extLst>
+                    <a:ext uri="{A12FA001-AC4F-418D-AE19-62706E023703}">
+                      <ahyp:hlinkClr xmlns:ahyp="http://schemas.microsoft.com/office/drawing/2018/hyperlinkcolor" val="tx"/>
+                    </a:ext>
+                  </a:extLst>
+                </a:hlinkClick>
+              </a:rPr>
+              <a:t>Graphics</a:t>
+            </a:r>
+            <a:r>
+              <a:rPr lang="es-ES" b="0" i="0" dirty="0">
+                <a:effectLst/>
+                <a:latin typeface="Trebuchet MS (Títulos)"/>
+              </a:rPr>
+              <a:t> . Usted proporciona los datos, le dice a ggplot2 cómo asignar variables a la estética, qué primitivas gráficas usar y se ocupa de los detalles.</a:t>
+            </a:r>
+          </a:p>
+          <a:p>
+            <a:pPr marL="0" indent="0">
+              <a:buNone/>
+            </a:pPr>
             <a:endParaRPr lang="es-ES" dirty="0">
               <a:latin typeface="Trebuchet MS (Títulos)"/>
             </a:endParaRPr>
           </a:p>
           <a:p>
-            <a:pPr algn="l"/>
+            <a:pPr marL="0" indent="0">
+              <a:buNone/>
+            </a:pPr>
             <a:r>
               <a:rPr lang="es-ES" b="0" i="0" dirty="0">
                 <a:effectLst/>
                 <a:latin typeface="Trebuchet MS (Títulos)"/>
               </a:rPr>
-              <a:t>El conocimiento del entorno en el que nos desenvolvemos también es esencial. Saber cómo funcionan las cosas, las reglas del juego y las oportunidades que se presentan nos da una ventaja para tomar decisiones inteligentes y aprovechar las situaciones a nuestro favor.</a:t>
-            </a:r>
-          </a:p>
-          <a:p>
-            <a:endParaRPr lang="es-ES" b="0" i="0" dirty="0">
-              <a:effectLst/>
-              <a:latin typeface="Söhne"/>
-            </a:endParaRPr>
-          </a:p>
-          <a:p>
-            <a:pPr algn="l"/>
-            <a:endParaRPr lang="es-ES" b="0" i="0" dirty="0">
-              <a:effectLst/>
-              <a:latin typeface="Söhne"/>
-            </a:endParaRPr>
-          </a:p>
-          <a:p>
-            <a:endParaRPr lang="es-CO" dirty="0"/>
+              <a:t> librería ggplot2:</a:t>
+            </a:r>
+          </a:p>
+          <a:p>
+            <a:r>
+              <a:rPr lang="es-ES" b="0" i="0" dirty="0" err="1">
+                <a:effectLst/>
+                <a:latin typeface="Trebuchet MS (Títulos)"/>
+              </a:rPr>
+              <a:t>instalar.paquetes</a:t>
+            </a:r>
+            <a:r>
+              <a:rPr lang="es-ES" b="0" i="0" dirty="0">
+                <a:effectLst/>
+                <a:latin typeface="Trebuchet MS (Títulos)"/>
+              </a:rPr>
+              <a:t>("ggplot2")</a:t>
+            </a:r>
           </a:p>
         </p:txBody>
       </p:sp>
     </p:spTree>
     <p:extLst>
       <p:ext uri="{BB962C8B-B14F-4D97-AF65-F5344CB8AC3E}">
-        <p14:creationId xmlns:p14="http://schemas.microsoft.com/office/powerpoint/2010/main" val="782508922"/>
+        <p14:creationId xmlns:p14="http://schemas.microsoft.com/office/powerpoint/2010/main" val="3556703902"/>
       </p:ext>
     </p:extLst>
   </p:cSld>
@@ -10132,7 +9994,7 @@
           <p:cNvPr id="2" name="Título 1">
             <a:extLst>
               <a:ext uri="{FF2B5EF4-FFF2-40B4-BE49-F238E27FC236}">
-                <a16:creationId xmlns:a16="http://schemas.microsoft.com/office/drawing/2014/main" id="{B62330A1-FD1E-4F20-DACF-3AFD8FE85805}"/>
+                <a16:creationId xmlns:a16="http://schemas.microsoft.com/office/drawing/2014/main" id="{D78D24A6-82F6-B69C-DBE8-E34AD5BC5FD6}"/>
               </a:ext>
             </a:extLst>
           </p:cNvPr>
@@ -10145,31 +10007,14 @@
         </p:nvSpPr>
         <p:spPr/>
         <p:txBody>
-          <a:bodyPr>
-            <a:normAutofit/>
-          </a:bodyPr>
+          <a:bodyPr/>
           <a:lstStyle/>
           <a:p>
-            <a:pPr marL="228600" indent="-228600">
-              <a:spcBef>
-                <a:spcPts val="1000"/>
-              </a:spcBef>
-              <a:buFont typeface="Arial" panose="020B0604020202020204" pitchFamily="34" charset="0"/>
-              <a:buChar char="•"/>
-            </a:pPr>
-            <a:r>
-              <a:rPr lang="es-MX" sz="2800" dirty="0">
-                <a:latin typeface="Trebuchet MS (Títulos)"/>
-                <a:ea typeface="+mn-ea"/>
-                <a:cs typeface="+mn-cs"/>
-              </a:rPr>
-              <a:t>La vida es una batalla</a:t>
-            </a:r>
-            <a:endParaRPr lang="es-CO" sz="2800" dirty="0">
-              <a:latin typeface="Trebuchet MS (Títulos)"/>
-              <a:ea typeface="+mn-ea"/>
-              <a:cs typeface="+mn-cs"/>
-            </a:endParaRPr>
+            <a:r>
+              <a:rPr lang="es-MX" sz="2800" dirty="0"/>
+              <a:t>Sintaxis</a:t>
+            </a:r>
+            <a:endParaRPr lang="es-CO" dirty="0"/>
           </a:p>
         </p:txBody>
       </p:sp>
@@ -10178,7 +10023,7 @@
           <p:cNvPr id="3" name="Marcador de contenido 2">
             <a:extLst>
               <a:ext uri="{FF2B5EF4-FFF2-40B4-BE49-F238E27FC236}">
-                <a16:creationId xmlns:a16="http://schemas.microsoft.com/office/drawing/2014/main" id="{F3F7B452-6521-1B77-5284-834AF63F229B}"/>
+                <a16:creationId xmlns:a16="http://schemas.microsoft.com/office/drawing/2014/main" id="{4C5CB410-5020-313C-2271-B98893D6CD0B}"/>
               </a:ext>
             </a:extLst>
           </p:cNvPr>
@@ -10192,46 +10037,201 @@
         <p:spPr/>
         <p:txBody>
           <a:bodyPr>
-            <a:normAutofit/>
+            <a:noAutofit/>
           </a:bodyPr>
           <a:lstStyle/>
           <a:p>
-            <a:pPr algn="l"/>
             <a:r>
               <a:rPr lang="es-ES" dirty="0">
                 <a:latin typeface="Trebuchet MS (Títulos)"/>
               </a:rPr>
-              <a:t>Imaginen que nuestra vida es como un campo de batalla, lleno de desafíos y obstáculos que debemos superar. En este "campo", el saber es nuestra arma secreta. Cuando enfrentamos problemas o decisiones difíciles, el conocimiento nos proporciona una guía valiosa.</a:t>
-            </a:r>
-          </a:p>
-          <a:p>
-            <a:pPr algn="l"/>
+              <a:t>Es difícil describir sucintamente cómo funciona ggplot2 porque encarna una profunda filosofía de visualización. Sin embargo, en la mayoría de los casos, comienza con:</a:t>
+            </a:r>
+          </a:p>
+          <a:p>
+            <a:r>
+              <a:rPr lang="es-ES" dirty="0" err="1">
+                <a:latin typeface="Trebuchet MS (Títulos)"/>
+              </a:rPr>
+              <a:t>ggplot</a:t>
+            </a:r>
             <a:r>
               <a:rPr lang="es-ES" dirty="0">
                 <a:latin typeface="Trebuchet MS (Títulos)"/>
               </a:rPr>
-              <a:t>Conocer a las personas que nos rodean, entender sus puntos de vista y emociones, nos ayuda a establecer conexiones más fuertes y a resolver conflictos. Al comprender sus fortalezas y debilidades, podemos formar equipos sólidos y apoyarnos mutuamente en momentos de necesidad.</a:t>
-            </a:r>
-          </a:p>
-          <a:p>
-            <a:pPr algn="l"/>
-            <a:endParaRPr lang="es-ES" b="0" i="0" dirty="0">
-              <a:effectLst/>
-              <a:latin typeface="Söhne"/>
-            </a:endParaRPr>
-          </a:p>
-          <a:p>
-            <a:endParaRPr lang="es-CO" dirty="0"/>
-          </a:p>
-          <a:p>
-            <a:endParaRPr lang="es-CO" dirty="0"/>
+              <a:t>(</a:t>
+            </a:r>
+            <a:r>
+              <a:rPr lang="es-ES" dirty="0" err="1">
+                <a:latin typeface="Trebuchet MS (Títulos)"/>
+              </a:rPr>
+              <a:t>datos_grafico</a:t>
+            </a:r>
+            <a:r>
+              <a:rPr lang="es-ES" dirty="0">
+                <a:latin typeface="Trebuchet MS (Títulos)"/>
+              </a:rPr>
+              <a:t>, </a:t>
+            </a:r>
+          </a:p>
+          <a:p>
+            <a:r>
+              <a:rPr lang="es-ES" dirty="0">
+                <a:latin typeface="Trebuchet MS (Títulos)"/>
+              </a:rPr>
+              <a:t>aes(x = Palabra, y = Numero, </a:t>
+            </a:r>
+            <a:r>
+              <a:rPr lang="es-ES" dirty="0" err="1">
+                <a:latin typeface="Trebuchet MS (Títulos)"/>
+              </a:rPr>
+              <a:t>fill</a:t>
+            </a:r>
+            <a:r>
+              <a:rPr lang="es-ES" dirty="0">
+                <a:latin typeface="Trebuchet MS (Títulos)"/>
+              </a:rPr>
+              <a:t> = Palabra)) + </a:t>
+            </a:r>
+          </a:p>
+          <a:p>
+            <a:r>
+              <a:rPr lang="es-ES" dirty="0" err="1">
+                <a:latin typeface="Trebuchet MS (Títulos)"/>
+              </a:rPr>
+              <a:t>geom_bar</a:t>
+            </a:r>
+            <a:r>
+              <a:rPr lang="es-ES" dirty="0">
+                <a:latin typeface="Trebuchet MS (Títulos)"/>
+              </a:rPr>
+              <a:t>(</a:t>
+            </a:r>
+            <a:r>
+              <a:rPr lang="es-ES" dirty="0" err="1">
+                <a:latin typeface="Trebuchet MS (Títulos)"/>
+              </a:rPr>
+              <a:t>stat</a:t>
+            </a:r>
+            <a:r>
+              <a:rPr lang="es-ES" dirty="0">
+                <a:latin typeface="Trebuchet MS (Títulos)"/>
+              </a:rPr>
+              <a:t> = "</a:t>
+            </a:r>
+            <a:r>
+              <a:rPr lang="es-ES" dirty="0" err="1">
+                <a:latin typeface="Trebuchet MS (Títulos)"/>
+              </a:rPr>
+              <a:t>identity</a:t>
+            </a:r>
+            <a:r>
+              <a:rPr lang="es-ES" dirty="0">
+                <a:latin typeface="Trebuchet MS (Títulos)"/>
+              </a:rPr>
+              <a:t>", color = "</a:t>
+            </a:r>
+            <a:r>
+              <a:rPr lang="es-ES" dirty="0" err="1">
+                <a:latin typeface="Trebuchet MS (Títulos)"/>
+              </a:rPr>
+              <a:t>black</a:t>
+            </a:r>
+            <a:r>
+              <a:rPr lang="es-ES" dirty="0">
+                <a:latin typeface="Trebuchet MS (Títulos)"/>
+              </a:rPr>
+              <a:t>") +  </a:t>
+            </a:r>
+          </a:p>
+          <a:p>
+            <a:r>
+              <a:rPr lang="es-ES" dirty="0" err="1">
+                <a:latin typeface="Trebuchet MS (Títulos)"/>
+              </a:rPr>
+              <a:t>labs</a:t>
+            </a:r>
+            <a:r>
+              <a:rPr lang="es-ES" dirty="0">
+                <a:latin typeface="Trebuchet MS (Títulos)"/>
+              </a:rPr>
+              <a:t>(x = NULL, y = "Número de frases", </a:t>
+            </a:r>
+            <a:r>
+              <a:rPr lang="es-ES" dirty="0" err="1">
+                <a:latin typeface="Trebuchet MS (Títulos)"/>
+              </a:rPr>
+              <a:t>title</a:t>
+            </a:r>
+            <a:r>
+              <a:rPr lang="es-ES" dirty="0">
+                <a:latin typeface="Trebuchet MS (Títulos)"/>
+              </a:rPr>
+              <a:t> = "Frases que contienen palabras clave") + </a:t>
+            </a:r>
+          </a:p>
+          <a:p>
+            <a:r>
+              <a:rPr lang="es-ES" dirty="0">
+                <a:latin typeface="Trebuchet MS (Títulos)"/>
+              </a:rPr>
+              <a:t> </a:t>
+            </a:r>
+            <a:r>
+              <a:rPr lang="es-ES" dirty="0" err="1">
+                <a:latin typeface="Trebuchet MS (Títulos)"/>
+              </a:rPr>
+              <a:t>theme</a:t>
+            </a:r>
+            <a:r>
+              <a:rPr lang="es-ES" dirty="0">
+                <a:latin typeface="Trebuchet MS (Títulos)"/>
+              </a:rPr>
+              <a:t>(</a:t>
+            </a:r>
+            <a:r>
+              <a:rPr lang="es-ES" dirty="0" err="1">
+                <a:latin typeface="Trebuchet MS (Títulos)"/>
+              </a:rPr>
+              <a:t>axis.text.x</a:t>
+            </a:r>
+            <a:r>
+              <a:rPr lang="es-ES" dirty="0">
+                <a:latin typeface="Trebuchet MS (Títulos)"/>
+              </a:rPr>
+              <a:t> = </a:t>
+            </a:r>
+            <a:r>
+              <a:rPr lang="es-ES" dirty="0" err="1">
+                <a:latin typeface="Trebuchet MS (Títulos)"/>
+              </a:rPr>
+              <a:t>element_text</a:t>
+            </a:r>
+            <a:r>
+              <a:rPr lang="es-ES" dirty="0">
+                <a:latin typeface="Trebuchet MS (Títulos)"/>
+              </a:rPr>
+              <a:t>(angle = 45, </a:t>
+            </a:r>
+            <a:r>
+              <a:rPr lang="es-ES" dirty="0" err="1">
+                <a:latin typeface="Trebuchet MS (Títulos)"/>
+              </a:rPr>
+              <a:t>hjust</a:t>
+            </a:r>
+            <a:r>
+              <a:rPr lang="es-ES" dirty="0">
+                <a:latin typeface="Trebuchet MS (Títulos)"/>
+              </a:rPr>
+              <a:t> = 1))</a:t>
+            </a:r>
           </a:p>
         </p:txBody>
       </p:sp>
     </p:spTree>
     <p:extLst>
       <p:ext uri="{BB962C8B-B14F-4D97-AF65-F5344CB8AC3E}">
-        <p14:creationId xmlns:p14="http://schemas.microsoft.com/office/powerpoint/2010/main" val="2138356295"/>
+        <p14:creationId xmlns:p14="http://schemas.microsoft.com/office/powerpoint/2010/main" val="4108334512"/>
       </p:ext>
     </p:extLst>
   </p:cSld>

</xml_diff>